<commit_message>
Corrected a typo on Week 5 assignment and added week 7
</commit_message>
<xml_diff>
--- a/Slingshot5.pptx
+++ b/Slingshot5.pptx
@@ -204,7 +204,7 @@
           <a:p>
             <a:fld id="{D20DB8D0-CB9B-4228-96F3-AC5E6B270968}" type="datetimeFigureOut">
               <a:rPr lang="en-US"/>
-              <a:t>2/12/2015</a:t>
+              <a:t>2/18/2015</a:t>
             </a:fld>
             <a:endParaRPr lang="en-US"/>
           </a:p>
@@ -1040,7 +1040,7 @@
           <a:p>
             <a:fld id="{746C1B4F-8499-4725-880F-F6EFDE14CFE8}" type="slidenum">
               <a:rPr lang="en-US"/>
-              <a:t>‹#›</a:t>
+              <a:t>7</a:t>
             </a:fld>
             <a:endParaRPr lang="en-US"/>
           </a:p>
@@ -1339,7 +1339,7 @@
           <a:p>
             <a:fld id="{52B4B4D3-8363-4434-8BD8-639AB40C65CA}" type="datetimeFigureOut">
               <a:rPr lang="en-US" smtClean="0"/>
-              <a:t>2/12/2015</a:t>
+              <a:t>2/18/2015</a:t>
             </a:fld>
             <a:endParaRPr lang="en-US"/>
           </a:p>
@@ -1620,7 +1620,7 @@
           <a:p>
             <a:fld id="{52B4B4D3-8363-4434-8BD8-639AB40C65CA}" type="datetimeFigureOut">
               <a:rPr lang="en-US" smtClean="0"/>
-              <a:t>2/12/2015</a:t>
+              <a:t>2/18/2015</a:t>
             </a:fld>
             <a:endParaRPr lang="en-US"/>
           </a:p>
@@ -1812,7 +1812,7 @@
           <a:p>
             <a:fld id="{52B4B4D3-8363-4434-8BD8-639AB40C65CA}" type="datetimeFigureOut">
               <a:rPr lang="en-US" smtClean="0"/>
-              <a:t>2/12/2015</a:t>
+              <a:t>2/18/2015</a:t>
             </a:fld>
             <a:endParaRPr lang="en-US"/>
           </a:p>
@@ -2073,7 +2073,7 @@
           <a:p>
             <a:fld id="{52B4B4D3-8363-4434-8BD8-639AB40C65CA}" type="datetimeFigureOut">
               <a:rPr lang="en-US" smtClean="0"/>
-              <a:t>2/12/2015</a:t>
+              <a:t>2/18/2015</a:t>
             </a:fld>
             <a:endParaRPr lang="en-US"/>
           </a:p>
@@ -2499,7 +2499,7 @@
           <a:p>
             <a:fld id="{52B4B4D3-8363-4434-8BD8-639AB40C65CA}" type="datetimeFigureOut">
               <a:rPr lang="en-US" smtClean="0"/>
-              <a:t>2/12/2015</a:t>
+              <a:t>2/18/2015</a:t>
             </a:fld>
             <a:endParaRPr lang="en-US"/>
           </a:p>
@@ -3045,7 +3045,7 @@
           <a:p>
             <a:fld id="{52B4B4D3-8363-4434-8BD8-639AB40C65CA}" type="datetimeFigureOut">
               <a:rPr lang="en-US" smtClean="0"/>
-              <a:t>2/12/2015</a:t>
+              <a:t>2/18/2015</a:t>
             </a:fld>
             <a:endParaRPr lang="en-US"/>
           </a:p>
@@ -3876,7 +3876,7 @@
           <a:p>
             <a:fld id="{52B4B4D3-8363-4434-8BD8-639AB40C65CA}" type="datetimeFigureOut">
               <a:rPr lang="en-US" smtClean="0"/>
-              <a:t>2/12/2015</a:t>
+              <a:t>2/18/2015</a:t>
             </a:fld>
             <a:endParaRPr lang="en-US"/>
           </a:p>
@@ -4046,7 +4046,7 @@
           <a:p>
             <a:fld id="{52B4B4D3-8363-4434-8BD8-639AB40C65CA}" type="datetimeFigureOut">
               <a:rPr lang="en-US" smtClean="0"/>
-              <a:t>2/12/2015</a:t>
+              <a:t>2/18/2015</a:t>
             </a:fld>
             <a:endParaRPr lang="en-US"/>
           </a:p>
@@ -4226,7 +4226,7 @@
           <a:p>
             <a:fld id="{52B4B4D3-8363-4434-8BD8-639AB40C65CA}" type="datetimeFigureOut">
               <a:rPr lang="en-US" smtClean="0"/>
-              <a:t>2/12/2015</a:t>
+              <a:t>2/18/2015</a:t>
             </a:fld>
             <a:endParaRPr lang="en-US"/>
           </a:p>
@@ -4396,7 +4396,7 @@
           <a:p>
             <a:fld id="{52B4B4D3-8363-4434-8BD8-639AB40C65CA}" type="datetimeFigureOut">
               <a:rPr lang="en-US" smtClean="0"/>
-              <a:t>2/12/2015</a:t>
+              <a:t>2/18/2015</a:t>
             </a:fld>
             <a:endParaRPr lang="en-US"/>
           </a:p>
@@ -4653,7 +4653,7 @@
           <a:p>
             <a:fld id="{52B4B4D3-8363-4434-8BD8-639AB40C65CA}" type="datetimeFigureOut">
               <a:rPr lang="en-US" smtClean="0"/>
-              <a:t>2/12/2015</a:t>
+              <a:t>2/18/2015</a:t>
             </a:fld>
             <a:endParaRPr lang="en-US"/>
           </a:p>
@@ -4885,7 +4885,7 @@
           <a:p>
             <a:fld id="{52B4B4D3-8363-4434-8BD8-639AB40C65CA}" type="datetimeFigureOut">
               <a:rPr lang="en-US" smtClean="0"/>
-              <a:t>2/12/2015</a:t>
+              <a:t>2/18/2015</a:t>
             </a:fld>
             <a:endParaRPr lang="en-US"/>
           </a:p>
@@ -5278,7 +5278,7 @@
           <a:p>
             <a:fld id="{52B4B4D3-8363-4434-8BD8-639AB40C65CA}" type="datetimeFigureOut">
               <a:rPr lang="en-US" smtClean="0"/>
-              <a:t>2/12/2015</a:t>
+              <a:t>2/18/2015</a:t>
             </a:fld>
             <a:endParaRPr lang="en-US"/>
           </a:p>
@@ -5396,7 +5396,7 @@
           <a:p>
             <a:fld id="{52B4B4D3-8363-4434-8BD8-639AB40C65CA}" type="datetimeFigureOut">
               <a:rPr lang="en-US" smtClean="0"/>
-              <a:t>2/12/2015</a:t>
+              <a:t>2/18/2015</a:t>
             </a:fld>
             <a:endParaRPr lang="en-US"/>
           </a:p>
@@ -5491,7 +5491,7 @@
           <a:p>
             <a:fld id="{52B4B4D3-8363-4434-8BD8-639AB40C65CA}" type="datetimeFigureOut">
               <a:rPr lang="en-US" smtClean="0"/>
-              <a:t>2/12/2015</a:t>
+              <a:t>2/18/2015</a:t>
             </a:fld>
             <a:endParaRPr lang="en-US"/>
           </a:p>
@@ -5764,7 +5764,7 @@
           <a:p>
             <a:fld id="{52B4B4D3-8363-4434-8BD8-639AB40C65CA}" type="datetimeFigureOut">
               <a:rPr lang="en-US" smtClean="0"/>
-              <a:t>2/12/2015</a:t>
+              <a:t>2/18/2015</a:t>
             </a:fld>
             <a:endParaRPr lang="en-US"/>
           </a:p>
@@ -6045,7 +6045,7 @@
           <a:p>
             <a:fld id="{52B4B4D3-8363-4434-8BD8-639AB40C65CA}" type="datetimeFigureOut">
               <a:rPr lang="en-US" smtClean="0"/>
-              <a:t>2/12/2015</a:t>
+              <a:t>2/18/2015</a:t>
             </a:fld>
             <a:endParaRPr lang="en-US"/>
           </a:p>
@@ -6285,7 +6285,7 @@
           <a:p>
             <a:fld id="{52B4B4D3-8363-4434-8BD8-639AB40C65CA}" type="datetimeFigureOut">
               <a:rPr lang="en-US" smtClean="0"/>
-              <a:t>2/12/2015</a:t>
+              <a:t>2/18/2015</a:t>
             </a:fld>
             <a:endParaRPr lang="en-US"/>
           </a:p>
@@ -8337,38 +8337,105 @@
           <a:lstStyle/>
           <a:p>
             <a:r>
-              <a:rPr lang="en-US">
+              <a:rPr lang="en-US" dirty="0">
                 <a:solidFill>
                   <a:srgbClr val="000000"/>
                 </a:solidFill>
                 <a:latin typeface="Courier New"/>
                 <a:cs typeface="Courier New"/>
               </a:rPr>
-              <a:t>void AddContact(Contact contact);</a:t>
-            </a:r>
-          </a:p>
-          <a:p>
-            <a:r>
-              <a:rPr lang="en-US">
+              <a:t>void </a:t>
+            </a:r>
+            <a:r>
+              <a:rPr lang="en-US" dirty="0" err="1">
+                <a:solidFill>
+                  <a:srgbClr val="000000"/>
+                </a:solidFill>
+                <a:latin typeface="Courier New"/>
+                <a:cs typeface="Courier New"/>
+              </a:rPr>
+              <a:t>AddContact</a:t>
+            </a:r>
+            <a:r>
+              <a:rPr lang="en-US" dirty="0">
+                <a:solidFill>
+                  <a:srgbClr val="000000"/>
+                </a:solidFill>
+                <a:latin typeface="Courier New"/>
+                <a:cs typeface="Courier New"/>
+              </a:rPr>
+              <a:t>(Contact contact);</a:t>
+            </a:r>
+          </a:p>
+          <a:p>
+            <a:r>
+              <a:rPr lang="en-US" dirty="0">
                 <a:solidFill>
                   <a:srgbClr val="000000"/>
                 </a:solidFill>
                 <a:latin typeface="Courier New" charset="0"/>
                 <a:cs typeface="Courier New" charset="0"/>
               </a:rPr>
-              <a:t>List&lt;Contact&gt; GetContacts(Contact contact); </a:t>
-            </a:r>
-          </a:p>
-          <a:p>
-            <a:r>
-              <a:rPr lang="en-US">
+              <a:t>List&lt;Contact&gt; </a:t>
+            </a:r>
+            <a:r>
+              <a:rPr lang="en-US" dirty="0" err="1" smtClean="0">
                 <a:solidFill>
                   <a:srgbClr val="000000"/>
                 </a:solidFill>
                 <a:latin typeface="Courier New" charset="0"/>
                 <a:cs typeface="Courier New" charset="0"/>
               </a:rPr>
-              <a:t>Contact Search(int id);</a:t>
+              <a:t>GetContacts</a:t>
+            </a:r>
+            <a:r>
+              <a:rPr lang="en-US" smtClean="0">
+                <a:solidFill>
+                  <a:srgbClr val="000000"/>
+                </a:solidFill>
+                <a:latin typeface="Courier New" charset="0"/>
+                <a:cs typeface="Courier New" charset="0"/>
+              </a:rPr>
+              <a:t>(); </a:t>
+            </a:r>
+            <a:endParaRPr lang="en-US" dirty="0">
+              <a:solidFill>
+                <a:srgbClr val="000000"/>
+              </a:solidFill>
+              <a:latin typeface="Courier New" charset="0"/>
+              <a:cs typeface="Courier New" charset="0"/>
+            </a:endParaRPr>
+          </a:p>
+          <a:p>
+            <a:r>
+              <a:rPr lang="en-US" dirty="0">
+                <a:solidFill>
+                  <a:srgbClr val="000000"/>
+                </a:solidFill>
+                <a:latin typeface="Courier New" charset="0"/>
+                <a:cs typeface="Courier New" charset="0"/>
+              </a:rPr>
+              <a:t>Contact Search(</a:t>
+            </a:r>
+            <a:r>
+              <a:rPr lang="en-US" dirty="0" err="1">
+                <a:solidFill>
+                  <a:srgbClr val="000000"/>
+                </a:solidFill>
+                <a:latin typeface="Courier New" charset="0"/>
+                <a:cs typeface="Courier New" charset="0"/>
+              </a:rPr>
+              <a:t>int</a:t>
+            </a:r>
+            <a:r>
+              <a:rPr lang="en-US" dirty="0">
+                <a:solidFill>
+                  <a:srgbClr val="000000"/>
+                </a:solidFill>
+                <a:latin typeface="Courier New" charset="0"/>
+                <a:cs typeface="Courier New" charset="0"/>
+              </a:rPr>
+              <a:t> id);</a:t>
             </a:r>
           </a:p>
         </p:txBody>

</xml_diff>